<commit_message>
Finished venture lab pitch deck pptx
</commit_message>
<xml_diff>
--- a/Pitches/Venture-lab-pitch.pptx
+++ b/Pitches/Venture-lab-pitch.pptx
@@ -5,13 +5,16 @@
     <p:sldMasterId id="2147483666" r:id="rId4"/>
   </p:sldMasterIdLst>
   <p:notesMasterIdLst>
-    <p:notesMasterId r:id="rId6"/>
+    <p:notesMasterId r:id="rId9"/>
   </p:notesMasterIdLst>
   <p:handoutMasterIdLst>
-    <p:handoutMasterId r:id="rId7"/>
+    <p:handoutMasterId r:id="rId10"/>
   </p:handoutMasterIdLst>
   <p:sldIdLst>
     <p:sldId id="256" r:id="rId5"/>
+    <p:sldId id="257" r:id="rId6"/>
+    <p:sldId id="258" r:id="rId7"/>
+    <p:sldId id="259" r:id="rId8"/>
   </p:sldIdLst>
   <p:sldSz cx="12192000" cy="6858000"/>
   <p:notesSz cx="6858000" cy="9144000"/>
@@ -15700,7 +15703,7 @@
             </a:br>
             <a:r>
               <a:rPr lang="en-GB" dirty="0"/>
-              <a:t>Pitch deck</a:t>
+              <a:t>pitch DECK</a:t>
             </a:r>
           </a:p>
         </p:txBody>
@@ -15798,6 +15801,1843 @@
     <p:extLst>
       <p:ext uri="{BB962C8B-B14F-4D97-AF65-F5344CB8AC3E}">
         <p14:creationId xmlns:p14="http://schemas.microsoft.com/office/powerpoint/2010/main" val="1642425379"/>
+      </p:ext>
+    </p:extLst>
+  </p:cSld>
+  <p:clrMapOvr>
+    <a:masterClrMapping/>
+  </p:clrMapOvr>
+</p:sld>
+</file>
+
+<file path=ppt/slides/slide2.xml><?xml version="1.0" encoding="utf-8"?>
+<p:sld xmlns:a="http://schemas.openxmlformats.org/drawingml/2006/main" xmlns:r="http://schemas.openxmlformats.org/officeDocument/2006/relationships" xmlns:p="http://schemas.openxmlformats.org/presentationml/2006/main">
+  <p:cSld>
+    <p:spTree>
+      <p:nvGrpSpPr>
+        <p:cNvPr id="1" name=""/>
+        <p:cNvGrpSpPr/>
+        <p:nvPr/>
+      </p:nvGrpSpPr>
+      <p:grpSpPr>
+        <a:xfrm>
+          <a:off x="0" y="0"/>
+          <a:ext cx="0" cy="0"/>
+          <a:chOff x="0" y="0"/>
+          <a:chExt cx="0" cy="0"/>
+        </a:xfrm>
+      </p:grpSpPr>
+      <p:sp>
+        <p:nvSpPr>
+          <p:cNvPr id="16" name="TextBox 15">
+            <a:extLst>
+              <a:ext uri="{FF2B5EF4-FFF2-40B4-BE49-F238E27FC236}">
+                <a16:creationId xmlns:a16="http://schemas.microsoft.com/office/drawing/2014/main" id="{63BD8B1E-4C53-3DA9-2D79-579B721E0962}"/>
+              </a:ext>
+            </a:extLst>
+          </p:cNvPr>
+          <p:cNvSpPr txBox="1"/>
+          <p:nvPr/>
+        </p:nvSpPr>
+        <p:spPr>
+          <a:xfrm>
+            <a:off x="2694813" y="1037366"/>
+            <a:ext cx="9067800" cy="3276282"/>
+          </a:xfrm>
+          <a:prstGeom prst="rect">
+            <a:avLst/>
+          </a:prstGeom>
+          <a:noFill/>
+        </p:spPr>
+        <p:txBody>
+          <a:bodyPr wrap="square" rtlCol="0">
+            <a:spAutoFit/>
+          </a:bodyPr>
+          <a:lstStyle/>
+          <a:p>
+            <a:pPr>
+              <a:lnSpc>
+                <a:spcPct val="150000"/>
+              </a:lnSpc>
+            </a:pPr>
+            <a:r>
+              <a:rPr lang="en-GB" sz="2000" b="1" dirty="0">
+                <a:latin typeface="Calibri" panose="020F0502020204030204" pitchFamily="34" charset="0"/>
+                <a:ea typeface="Calibri" panose="020F0502020204030204" pitchFamily="34" charset="0"/>
+                <a:cs typeface="Calibri" panose="020F0502020204030204" pitchFamily="34" charset="0"/>
+              </a:rPr>
+              <a:t>Unlike 		</a:t>
+            </a:r>
+            <a:r>
+              <a:rPr lang="en-GB" sz="2000" dirty="0">
+                <a:latin typeface="Calibri" panose="020F0502020204030204" pitchFamily="34" charset="0"/>
+                <a:ea typeface="Calibri" panose="020F0502020204030204" pitchFamily="34" charset="0"/>
+                <a:cs typeface="Calibri" panose="020F0502020204030204" pitchFamily="34" charset="0"/>
+              </a:rPr>
+              <a:t>Budgeting Apps </a:t>
+            </a:r>
+            <a:r>
+              <a:rPr lang="en-GB" sz="2000" i="1" dirty="0">
+                <a:latin typeface="Calibri" panose="020F0502020204030204" pitchFamily="34" charset="0"/>
+                <a:ea typeface="Calibri" panose="020F0502020204030204" pitchFamily="34" charset="0"/>
+                <a:cs typeface="Calibri" panose="020F0502020204030204" pitchFamily="34" charset="0"/>
+              </a:rPr>
+              <a:t>(YNAB) </a:t>
+            </a:r>
+            <a:r>
+              <a:rPr lang="en-GB" sz="2000" dirty="0">
+                <a:latin typeface="Calibri" panose="020F0502020204030204" pitchFamily="34" charset="0"/>
+                <a:ea typeface="Calibri" panose="020F0502020204030204" pitchFamily="34" charset="0"/>
+                <a:cs typeface="Calibri" panose="020F0502020204030204" pitchFamily="34" charset="0"/>
+              </a:rPr>
+              <a:t>or Finance Apps/Mobile Banks </a:t>
+            </a:r>
+            <a:r>
+              <a:rPr lang="en-GB" sz="2000" i="1" dirty="0">
+                <a:latin typeface="Calibri" panose="020F0502020204030204" pitchFamily="34" charset="0"/>
+                <a:ea typeface="Calibri" panose="020F0502020204030204" pitchFamily="34" charset="0"/>
+                <a:cs typeface="Calibri" panose="020F0502020204030204" pitchFamily="34" charset="0"/>
+              </a:rPr>
+              <a:t>(</a:t>
+            </a:r>
+            <a:r>
+              <a:rPr lang="en-GB" sz="2000" i="1" dirty="0" err="1">
+                <a:latin typeface="Calibri" panose="020F0502020204030204" pitchFamily="34" charset="0"/>
+                <a:ea typeface="Calibri" panose="020F0502020204030204" pitchFamily="34" charset="0"/>
+                <a:cs typeface="Calibri" panose="020F0502020204030204" pitchFamily="34" charset="0"/>
+              </a:rPr>
+              <a:t>Revolut</a:t>
+            </a:r>
+            <a:r>
+              <a:rPr lang="en-GB" sz="2000" i="1" dirty="0">
+                <a:latin typeface="Calibri" panose="020F0502020204030204" pitchFamily="34" charset="0"/>
+                <a:ea typeface="Calibri" panose="020F0502020204030204" pitchFamily="34" charset="0"/>
+                <a:cs typeface="Calibri" panose="020F0502020204030204" pitchFamily="34" charset="0"/>
+              </a:rPr>
+              <a:t>)</a:t>
+            </a:r>
+            <a:endParaRPr lang="en-GB" sz="2000" b="1" i="1" dirty="0">
+              <a:latin typeface="Calibri" panose="020F0502020204030204" pitchFamily="34" charset="0"/>
+              <a:ea typeface="Calibri" panose="020F0502020204030204" pitchFamily="34" charset="0"/>
+              <a:cs typeface="Calibri" panose="020F0502020204030204" pitchFamily="34" charset="0"/>
+            </a:endParaRPr>
+          </a:p>
+          <a:p>
+            <a:pPr>
+              <a:lnSpc>
+                <a:spcPct val="150000"/>
+              </a:lnSpc>
+            </a:pPr>
+            <a:r>
+              <a:rPr lang="en-GB" sz="2000" b="1" dirty="0">
+                <a:latin typeface="Calibri" panose="020F0502020204030204" pitchFamily="34" charset="0"/>
+                <a:ea typeface="Calibri" panose="020F0502020204030204" pitchFamily="34" charset="0"/>
+                <a:cs typeface="Calibri" panose="020F0502020204030204" pitchFamily="34" charset="0"/>
+              </a:rPr>
+              <a:t>our</a:t>
+            </a:r>
+            <a:r>
+              <a:rPr lang="en-GB" sz="2000" dirty="0">
+                <a:latin typeface="Calibri" panose="020F0502020204030204" pitchFamily="34" charset="0"/>
+                <a:ea typeface="Calibri" panose="020F0502020204030204" pitchFamily="34" charset="0"/>
+                <a:cs typeface="Calibri" panose="020F0502020204030204" pitchFamily="34" charset="0"/>
+              </a:rPr>
+              <a:t> 		web application “Opulence Money”</a:t>
+            </a:r>
+          </a:p>
+          <a:p>
+            <a:pPr>
+              <a:lnSpc>
+                <a:spcPct val="150000"/>
+              </a:lnSpc>
+            </a:pPr>
+            <a:r>
+              <a:rPr lang="en-GB" sz="2000" b="1" dirty="0">
+                <a:latin typeface="Calibri" panose="020F0502020204030204" pitchFamily="34" charset="0"/>
+                <a:ea typeface="Calibri" panose="020F0502020204030204" pitchFamily="34" charset="0"/>
+                <a:cs typeface="Calibri" panose="020F0502020204030204" pitchFamily="34" charset="0"/>
+              </a:rPr>
+              <a:t>helps 		</a:t>
+            </a:r>
+            <a:r>
+              <a:rPr lang="en-GB" sz="2000" dirty="0">
+                <a:latin typeface="Calibri" panose="020F0502020204030204" pitchFamily="34" charset="0"/>
+                <a:ea typeface="Calibri" panose="020F0502020204030204" pitchFamily="34" charset="0"/>
+                <a:cs typeface="Calibri" panose="020F0502020204030204" pitchFamily="34" charset="0"/>
+              </a:rPr>
+              <a:t>individuals with multiple banks</a:t>
+            </a:r>
+          </a:p>
+          <a:p>
+            <a:pPr>
+              <a:lnSpc>
+                <a:spcPct val="150000"/>
+              </a:lnSpc>
+            </a:pPr>
+            <a:r>
+              <a:rPr lang="en-GB" sz="2000" b="1" dirty="0">
+                <a:latin typeface="Calibri" panose="020F0502020204030204" pitchFamily="34" charset="0"/>
+                <a:ea typeface="Calibri" panose="020F0502020204030204" pitchFamily="34" charset="0"/>
+                <a:cs typeface="Calibri" panose="020F0502020204030204" pitchFamily="34" charset="0"/>
+              </a:rPr>
+              <a:t>who want	</a:t>
+            </a:r>
+            <a:r>
+              <a:rPr lang="en-GB" sz="2000" dirty="0">
+                <a:latin typeface="Calibri" panose="020F0502020204030204" pitchFamily="34" charset="0"/>
+                <a:ea typeface="Calibri" panose="020F0502020204030204" pitchFamily="34" charset="0"/>
+                <a:cs typeface="Calibri" panose="020F0502020204030204" pitchFamily="34" charset="0"/>
+              </a:rPr>
+              <a:t>control and clarity over their net worth and spending</a:t>
+            </a:r>
+          </a:p>
+          <a:p>
+            <a:pPr>
+              <a:lnSpc>
+                <a:spcPct val="150000"/>
+              </a:lnSpc>
+            </a:pPr>
+            <a:r>
+              <a:rPr lang="en-GB" sz="2000" b="1" dirty="0">
+                <a:latin typeface="Calibri" panose="020F0502020204030204" pitchFamily="34" charset="0"/>
+                <a:ea typeface="Calibri" panose="020F0502020204030204" pitchFamily="34" charset="0"/>
+                <a:cs typeface="Calibri" panose="020F0502020204030204" pitchFamily="34" charset="0"/>
+              </a:rPr>
+              <a:t>by		</a:t>
+            </a:r>
+            <a:r>
+              <a:rPr lang="en-GB" sz="2000" dirty="0">
+                <a:latin typeface="Calibri" panose="020F0502020204030204" pitchFamily="34" charset="0"/>
+                <a:ea typeface="Calibri" panose="020F0502020204030204" pitchFamily="34" charset="0"/>
+                <a:cs typeface="Calibri" panose="020F0502020204030204" pitchFamily="34" charset="0"/>
+              </a:rPr>
+              <a:t>eliminating hassle &amp; confusion of manually monitoring finances</a:t>
+            </a:r>
+            <a:endParaRPr lang="en-GB" sz="2000" b="1" dirty="0">
+              <a:latin typeface="Calibri" panose="020F0502020204030204" pitchFamily="34" charset="0"/>
+              <a:ea typeface="Calibri" panose="020F0502020204030204" pitchFamily="34" charset="0"/>
+              <a:cs typeface="Calibri" panose="020F0502020204030204" pitchFamily="34" charset="0"/>
+            </a:endParaRPr>
+          </a:p>
+          <a:p>
+            <a:pPr>
+              <a:lnSpc>
+                <a:spcPct val="150000"/>
+              </a:lnSpc>
+            </a:pPr>
+            <a:r>
+              <a:rPr lang="en-GB" sz="2000" b="1" dirty="0">
+                <a:latin typeface="Calibri" panose="020F0502020204030204" pitchFamily="34" charset="0"/>
+                <a:ea typeface="Calibri" panose="020F0502020204030204" pitchFamily="34" charset="0"/>
+                <a:cs typeface="Calibri" panose="020F0502020204030204" pitchFamily="34" charset="0"/>
+              </a:rPr>
+              <a:t>and		</a:t>
+            </a:r>
+            <a:r>
+              <a:rPr lang="en-GB" sz="2000" dirty="0">
+                <a:latin typeface="Calibri" panose="020F0502020204030204" pitchFamily="34" charset="0"/>
+                <a:ea typeface="Calibri" panose="020F0502020204030204" pitchFamily="34" charset="0"/>
+                <a:cs typeface="Calibri" panose="020F0502020204030204" pitchFamily="34" charset="0"/>
+              </a:rPr>
+              <a:t>providing improved personalised budgets</a:t>
+            </a:r>
+          </a:p>
+          <a:p>
+            <a:pPr>
+              <a:lnSpc>
+                <a:spcPct val="150000"/>
+              </a:lnSpc>
+            </a:pPr>
+            <a:r>
+              <a:rPr lang="en-GB" sz="2000" b="1" dirty="0">
+                <a:latin typeface="Calibri" panose="020F0502020204030204" pitchFamily="34" charset="0"/>
+                <a:ea typeface="Calibri" panose="020F0502020204030204" pitchFamily="34" charset="0"/>
+                <a:cs typeface="Calibri" panose="020F0502020204030204" pitchFamily="34" charset="0"/>
+              </a:rPr>
+              <a:t>and</a:t>
+            </a:r>
+            <a:r>
+              <a:rPr lang="en-GB" sz="2000" dirty="0">
+                <a:latin typeface="Calibri" panose="020F0502020204030204" pitchFamily="34" charset="0"/>
+                <a:ea typeface="Calibri" panose="020F0502020204030204" pitchFamily="34" charset="0"/>
+                <a:cs typeface="Calibri" panose="020F0502020204030204" pitchFamily="34" charset="0"/>
+              </a:rPr>
+              <a:t>		automating net worth tracking</a:t>
+            </a:r>
+            <a:endParaRPr lang="en-GB" sz="2000" b="1" dirty="0">
+              <a:latin typeface="Calibri" panose="020F0502020204030204" pitchFamily="34" charset="0"/>
+              <a:ea typeface="Calibri" panose="020F0502020204030204" pitchFamily="34" charset="0"/>
+              <a:cs typeface="Calibri" panose="020F0502020204030204" pitchFamily="34" charset="0"/>
+            </a:endParaRPr>
+          </a:p>
+        </p:txBody>
+      </p:sp>
+      <p:pic>
+        <p:nvPicPr>
+          <p:cNvPr id="17" name="Picture 16" descr="A purple circle with white text&#10;&#10;Description automatically generated">
+            <a:extLst>
+              <a:ext uri="{FF2B5EF4-FFF2-40B4-BE49-F238E27FC236}">
+                <a16:creationId xmlns:a16="http://schemas.microsoft.com/office/drawing/2014/main" id="{247A4B31-A091-1550-DB0E-A0899C0D6F81}"/>
+              </a:ext>
+            </a:extLst>
+          </p:cNvPr>
+          <p:cNvPicPr>
+            <a:picLocks noChangeAspect="1"/>
+          </p:cNvPicPr>
+          <p:nvPr/>
+        </p:nvPicPr>
+        <p:blipFill>
+          <a:blip r:embed="rId2"/>
+          <a:stretch>
+            <a:fillRect/>
+          </a:stretch>
+        </p:blipFill>
+        <p:spPr>
+          <a:xfrm>
+            <a:off x="0" y="3949428"/>
+            <a:ext cx="3387887" cy="3387887"/>
+          </a:xfrm>
+          <a:prstGeom prst="rect">
+            <a:avLst/>
+          </a:prstGeom>
+        </p:spPr>
+      </p:pic>
+      <p:sp>
+        <p:nvSpPr>
+          <p:cNvPr id="19" name="Title 1">
+            <a:extLst>
+              <a:ext uri="{FF2B5EF4-FFF2-40B4-BE49-F238E27FC236}">
+                <a16:creationId xmlns:a16="http://schemas.microsoft.com/office/drawing/2014/main" id="{0E1FA8A4-A96A-03B9-7A3B-7B8EAA7133AE}"/>
+              </a:ext>
+            </a:extLst>
+          </p:cNvPr>
+          <p:cNvSpPr txBox="1">
+            <a:spLocks/>
+          </p:cNvSpPr>
+          <p:nvPr/>
+        </p:nvSpPr>
+        <p:spPr>
+          <a:xfrm>
+            <a:off x="6820842" y="5349240"/>
+            <a:ext cx="4941771" cy="1122202"/>
+          </a:xfrm>
+          <a:prstGeom prst="rect">
+            <a:avLst/>
+          </a:prstGeom>
+        </p:spPr>
+        <p:txBody>
+          <a:bodyPr vert="horz" lIns="91440" tIns="45720" rIns="91440" bIns="45720" rtlCol="0" anchor="b">
+            <a:normAutofit/>
+          </a:bodyPr>
+          <a:lstStyle>
+            <a:lvl1pPr algn="l" defTabSz="914400" rtl="0" eaLnBrk="1" latinLnBrk="0" hangingPunct="1">
+              <a:lnSpc>
+                <a:spcPct val="90000"/>
+              </a:lnSpc>
+              <a:spcBef>
+                <a:spcPct val="0"/>
+              </a:spcBef>
+              <a:buNone/>
+              <a:defRPr lang="en-US" sz="2800" kern="1200" cap="all" spc="150" baseline="0" dirty="0">
+                <a:solidFill>
+                  <a:schemeClr val="tx1"/>
+                </a:solidFill>
+                <a:latin typeface="+mj-lt"/>
+                <a:ea typeface="+mj-ea"/>
+                <a:cs typeface="+mj-cs"/>
+              </a:defRPr>
+            </a:lvl1pPr>
+          </a:lstStyle>
+          <a:p>
+            <a:pPr algn="r"/>
+            <a:r>
+              <a:rPr lang="en-GB" dirty="0"/>
+              <a:t>Opulence money</a:t>
+            </a:r>
+            <a:br>
+              <a:rPr lang="en-GB" dirty="0"/>
+            </a:br>
+            <a:r>
+              <a:rPr lang="en-GB" dirty="0"/>
+              <a:t>Elevator pitch</a:t>
+            </a:r>
+          </a:p>
+        </p:txBody>
+      </p:sp>
+    </p:spTree>
+    <p:extLst>
+      <p:ext uri="{BB962C8B-B14F-4D97-AF65-F5344CB8AC3E}">
+        <p14:creationId xmlns:p14="http://schemas.microsoft.com/office/powerpoint/2010/main" val="142197157"/>
+      </p:ext>
+    </p:extLst>
+  </p:cSld>
+  <p:clrMapOvr>
+    <a:masterClrMapping/>
+  </p:clrMapOvr>
+</p:sld>
+</file>
+
+<file path=ppt/slides/slide3.xml><?xml version="1.0" encoding="utf-8"?>
+<p:sld xmlns:a="http://schemas.openxmlformats.org/drawingml/2006/main" xmlns:r="http://schemas.openxmlformats.org/officeDocument/2006/relationships" xmlns:p="http://schemas.openxmlformats.org/presentationml/2006/main">
+  <p:cSld>
+    <p:spTree>
+      <p:nvGrpSpPr>
+        <p:cNvPr id="1" name=""/>
+        <p:cNvGrpSpPr/>
+        <p:nvPr/>
+      </p:nvGrpSpPr>
+      <p:grpSpPr>
+        <a:xfrm>
+          <a:off x="0" y="0"/>
+          <a:ext cx="0" cy="0"/>
+          <a:chOff x="0" y="0"/>
+          <a:chExt cx="0" cy="0"/>
+        </a:xfrm>
+      </p:grpSpPr>
+      <p:sp>
+        <p:nvSpPr>
+          <p:cNvPr id="12" name="Title 1">
+            <a:extLst>
+              <a:ext uri="{FF2B5EF4-FFF2-40B4-BE49-F238E27FC236}">
+                <a16:creationId xmlns:a16="http://schemas.microsoft.com/office/drawing/2014/main" id="{7D701497-E9C4-1CF9-FF15-580C12AD2269}"/>
+              </a:ext>
+            </a:extLst>
+          </p:cNvPr>
+          <p:cNvSpPr txBox="1">
+            <a:spLocks/>
+          </p:cNvSpPr>
+          <p:nvPr/>
+        </p:nvSpPr>
+        <p:spPr>
+          <a:xfrm>
+            <a:off x="7250229" y="0"/>
+            <a:ext cx="4941771" cy="619760"/>
+          </a:xfrm>
+          <a:prstGeom prst="rect">
+            <a:avLst/>
+          </a:prstGeom>
+        </p:spPr>
+        <p:txBody>
+          <a:bodyPr vert="horz" lIns="91440" tIns="45720" rIns="91440" bIns="45720" rtlCol="0" anchor="b">
+            <a:normAutofit/>
+          </a:bodyPr>
+          <a:lstStyle>
+            <a:lvl1pPr algn="l" defTabSz="914400" rtl="0" eaLnBrk="1" latinLnBrk="0" hangingPunct="1">
+              <a:lnSpc>
+                <a:spcPct val="90000"/>
+              </a:lnSpc>
+              <a:spcBef>
+                <a:spcPct val="0"/>
+              </a:spcBef>
+              <a:buNone/>
+              <a:defRPr lang="en-US" sz="2800" kern="1200" cap="all" spc="150" baseline="0" dirty="0">
+                <a:solidFill>
+                  <a:schemeClr val="tx1"/>
+                </a:solidFill>
+                <a:latin typeface="+mj-lt"/>
+                <a:ea typeface="+mj-ea"/>
+                <a:cs typeface="+mj-cs"/>
+              </a:defRPr>
+            </a:lvl1pPr>
+          </a:lstStyle>
+          <a:p>
+            <a:pPr algn="r"/>
+            <a:r>
+              <a:rPr lang="en-GB" dirty="0"/>
+              <a:t>Opulence money | pitch</a:t>
+            </a:r>
+          </a:p>
+        </p:txBody>
+      </p:sp>
+      <p:pic>
+        <p:nvPicPr>
+          <p:cNvPr id="13" name="Picture 12" descr="A purple circle with white text&#10;&#10;Description automatically generated">
+            <a:extLst>
+              <a:ext uri="{FF2B5EF4-FFF2-40B4-BE49-F238E27FC236}">
+                <a16:creationId xmlns:a16="http://schemas.microsoft.com/office/drawing/2014/main" id="{10DAA4CF-BCE6-A0A2-8A01-834BA4FB3284}"/>
+              </a:ext>
+            </a:extLst>
+          </p:cNvPr>
+          <p:cNvPicPr>
+            <a:picLocks noChangeAspect="1"/>
+          </p:cNvPicPr>
+          <p:nvPr/>
+        </p:nvPicPr>
+        <p:blipFill>
+          <a:blip r:embed="rId2"/>
+          <a:stretch>
+            <a:fillRect/>
+          </a:stretch>
+        </p:blipFill>
+        <p:spPr>
+          <a:xfrm>
+            <a:off x="0" y="0"/>
+            <a:ext cx="1043673" cy="1043673"/>
+          </a:xfrm>
+          <a:prstGeom prst="rect">
+            <a:avLst/>
+          </a:prstGeom>
+        </p:spPr>
+      </p:pic>
+      <p:graphicFrame>
+        <p:nvGraphicFramePr>
+          <p:cNvPr id="15" name="Table 14">
+            <a:extLst>
+              <a:ext uri="{FF2B5EF4-FFF2-40B4-BE49-F238E27FC236}">
+                <a16:creationId xmlns:a16="http://schemas.microsoft.com/office/drawing/2014/main" id="{F6B0E133-C363-95A7-A005-7484EEB0BD3A}"/>
+              </a:ext>
+            </a:extLst>
+          </p:cNvPr>
+          <p:cNvGraphicFramePr>
+            <a:graphicFrameLocks noGrp="1"/>
+          </p:cNvGraphicFramePr>
+          <p:nvPr>
+            <p:extLst>
+              <p:ext uri="{D42A27DB-BD31-4B8C-83A1-F6EECF244321}">
+                <p14:modId xmlns:p14="http://schemas.microsoft.com/office/powerpoint/2010/main" val="1820290516"/>
+              </p:ext>
+            </p:extLst>
+          </p:nvPr>
+        </p:nvGraphicFramePr>
+        <p:xfrm>
+          <a:off x="406400" y="619760"/>
+          <a:ext cx="11572240" cy="6126480"/>
+        </p:xfrm>
+        <a:graphic>
+          <a:graphicData uri="http://schemas.openxmlformats.org/drawingml/2006/table">
+            <a:tbl>
+              <a:tblPr bandRow="1">
+                <a:tableStyleId>{5C22544A-7EE6-4342-B048-85BDC9FD1C3A}</a:tableStyleId>
+              </a:tblPr>
+              <a:tblGrid>
+                <a:gridCol w="3556000">
+                  <a:extLst>
+                    <a:ext uri="{9D8B030D-6E8A-4147-A177-3AD203B41FA5}">
+                      <a16:colId xmlns:a16="http://schemas.microsoft.com/office/drawing/2014/main" val="4003804386"/>
+                    </a:ext>
+                  </a:extLst>
+                </a:gridCol>
+                <a:gridCol w="2438400">
+                  <a:extLst>
+                    <a:ext uri="{9D8B030D-6E8A-4147-A177-3AD203B41FA5}">
+                      <a16:colId xmlns:a16="http://schemas.microsoft.com/office/drawing/2014/main" val="1020393046"/>
+                    </a:ext>
+                  </a:extLst>
+                </a:gridCol>
+                <a:gridCol w="2684780">
+                  <a:extLst>
+                    <a:ext uri="{9D8B030D-6E8A-4147-A177-3AD203B41FA5}">
+                      <a16:colId xmlns:a16="http://schemas.microsoft.com/office/drawing/2014/main" val="3045206403"/>
+                    </a:ext>
+                  </a:extLst>
+                </a:gridCol>
+                <a:gridCol w="2893060">
+                  <a:extLst>
+                    <a:ext uri="{9D8B030D-6E8A-4147-A177-3AD203B41FA5}">
+                      <a16:colId xmlns:a16="http://schemas.microsoft.com/office/drawing/2014/main" val="2876700133"/>
+                    </a:ext>
+                  </a:extLst>
+                </a:gridCol>
+              </a:tblGrid>
+              <a:tr h="295596">
+                <a:tc>
+                  <a:txBody>
+                    <a:bodyPr/>
+                    <a:lstStyle/>
+                    <a:p>
+                      <a:r>
+                        <a:rPr lang="en-GB" b="1" dirty="0">
+                          <a:solidFill>
+                            <a:schemeClr val="tx1"/>
+                          </a:solidFill>
+                        </a:rPr>
+                        <a:t>Problem</a:t>
+                      </a:r>
+                    </a:p>
+                  </a:txBody>
+                  <a:tcPr/>
+                </a:tc>
+                <a:tc gridSpan="3">
+                  <a:txBody>
+                    <a:bodyPr/>
+                    <a:lstStyle/>
+                    <a:p>
+                      <a:pPr marL="0" marR="0" lvl="0" indent="0" algn="l" defTabSz="914400" rtl="0" eaLnBrk="1" fontAlgn="auto" latinLnBrk="0" hangingPunct="1">
+                        <a:lnSpc>
+                          <a:spcPct val="100000"/>
+                        </a:lnSpc>
+                        <a:spcBef>
+                          <a:spcPts val="0"/>
+                        </a:spcBef>
+                        <a:spcAft>
+                          <a:spcPts val="0"/>
+                        </a:spcAft>
+                        <a:buClrTx/>
+                        <a:buSzTx/>
+                        <a:buFontTx/>
+                        <a:buNone/>
+                        <a:tabLst/>
+                        <a:defRPr/>
+                      </a:pPr>
+                      <a:r>
+                        <a:rPr lang="en-GB" b="1" dirty="0">
+                          <a:solidFill>
+                            <a:schemeClr val="tx1"/>
+                          </a:solidFill>
+                        </a:rPr>
+                        <a:t>Solution </a:t>
+                      </a:r>
+                      <a:r>
+                        <a:rPr lang="en-GB" b="0" i="1" dirty="0">
+                          <a:solidFill>
+                            <a:schemeClr val="tx1"/>
+                          </a:solidFill>
+                        </a:rPr>
+                        <a:t>(Implementation) </a:t>
+                      </a:r>
+                      <a:endParaRPr lang="en-GB" b="0" dirty="0">
+                        <a:solidFill>
+                          <a:schemeClr val="tx1"/>
+                        </a:solidFill>
+                      </a:endParaRPr>
+                    </a:p>
+                  </a:txBody>
+                  <a:tcPr/>
+                </a:tc>
+                <a:tc hMerge="1">
+                  <a:txBody>
+                    <a:bodyPr/>
+                    <a:lstStyle/>
+                    <a:p>
+                      <a:endParaRPr lang="en-GB"/>
+                    </a:p>
+                  </a:txBody>
+                  <a:tcPr/>
+                </a:tc>
+                <a:tc hMerge="1">
+                  <a:txBody>
+                    <a:bodyPr/>
+                    <a:lstStyle/>
+                    <a:p>
+                      <a:endParaRPr lang="en-GB" b="1" dirty="0"/>
+                    </a:p>
+                  </a:txBody>
+                  <a:tcPr/>
+                </a:tc>
+                <a:extLst>
+                  <a:ext uri="{0D108BD9-81ED-4DB2-BD59-A6C34878D82A}">
+                    <a16:rowId xmlns:a16="http://schemas.microsoft.com/office/drawing/2014/main" val="3676029872"/>
+                  </a:ext>
+                </a:extLst>
+              </a:tr>
+              <a:tr h="2266636">
+                <a:tc>
+                  <a:txBody>
+                    <a:bodyPr/>
+                    <a:lstStyle/>
+                    <a:p>
+                      <a:pPr marL="285750" indent="-285750">
+                        <a:buFont typeface="Arial" panose="020B0604020202020204" pitchFamily="34" charset="0"/>
+                        <a:buChar char="•"/>
+                      </a:pPr>
+                      <a:r>
+                        <a:rPr lang="en-GB" dirty="0">
+                          <a:solidFill>
+                            <a:schemeClr val="tx1"/>
+                          </a:solidFill>
+                        </a:rPr>
+                        <a:t>Hard to track multiple banks/savings accounts</a:t>
+                      </a:r>
+                    </a:p>
+                    <a:p>
+                      <a:pPr marL="285750" indent="-285750">
+                        <a:buFont typeface="Arial" panose="020B0604020202020204" pitchFamily="34" charset="0"/>
+                        <a:buChar char="•"/>
+                      </a:pPr>
+                      <a:r>
+                        <a:rPr lang="en-GB" dirty="0">
+                          <a:solidFill>
+                            <a:schemeClr val="tx1"/>
+                          </a:solidFill>
+                        </a:rPr>
+                        <a:t>Therefore, personal finances + net worth confusing (e.g. spreadsheets)</a:t>
+                      </a:r>
+                    </a:p>
+                    <a:p>
+                      <a:pPr marL="285750" indent="-285750">
+                        <a:buFont typeface="Arial" panose="020B0604020202020204" pitchFamily="34" charset="0"/>
+                        <a:buChar char="•"/>
+                      </a:pPr>
+                      <a:r>
+                        <a:rPr lang="en-GB" dirty="0">
+                          <a:solidFill>
+                            <a:schemeClr val="tx1"/>
+                          </a:solidFill>
+                        </a:rPr>
+                        <a:t>No go-to unified app to total track spending</a:t>
+                      </a:r>
+                    </a:p>
+                    <a:p>
+                      <a:pPr marL="285750" indent="-285750">
+                        <a:buFont typeface="Arial" panose="020B0604020202020204" pitchFamily="34" charset="0"/>
+                        <a:buChar char="•"/>
+                      </a:pPr>
+                      <a:r>
+                        <a:rPr lang="en-GB" dirty="0">
+                          <a:solidFill>
+                            <a:schemeClr val="tx1"/>
+                          </a:solidFill>
+                        </a:rPr>
+                        <a:t>So, hard to budget effectively</a:t>
+                      </a:r>
+                    </a:p>
+                  </a:txBody>
+                  <a:tcPr/>
+                </a:tc>
+                <a:tc gridSpan="3">
+                  <a:txBody>
+                    <a:bodyPr/>
+                    <a:lstStyle/>
+                    <a:p>
+                      <a:pPr marL="285750" indent="-285750">
+                        <a:buFont typeface="Arial" panose="020B0604020202020204" pitchFamily="34" charset="0"/>
+                        <a:buChar char="•"/>
+                      </a:pPr>
+                      <a:r>
+                        <a:rPr lang="en-GB" dirty="0">
+                          <a:solidFill>
+                            <a:schemeClr val="tx1"/>
+                          </a:solidFill>
+                        </a:rPr>
+                        <a:t>Unify all accounts into one dashboard automatically </a:t>
+                      </a:r>
+                      <a:r>
+                        <a:rPr lang="en-GB" i="1" dirty="0">
+                          <a:solidFill>
+                            <a:schemeClr val="tx1"/>
+                          </a:solidFill>
+                        </a:rPr>
+                        <a:t>(Open Banking API, PDF Statement processing)</a:t>
+                      </a:r>
+                      <a:endParaRPr lang="en-GB" dirty="0">
+                        <a:solidFill>
+                          <a:schemeClr val="tx1"/>
+                        </a:solidFill>
+                      </a:endParaRPr>
+                    </a:p>
+                    <a:p>
+                      <a:pPr marL="285750" indent="-285750">
+                        <a:buFont typeface="Arial" panose="020B0604020202020204" pitchFamily="34" charset="0"/>
+                        <a:buChar char="•"/>
+                      </a:pPr>
+                      <a:r>
+                        <a:rPr lang="en-GB" dirty="0">
+                          <a:solidFill>
+                            <a:schemeClr val="tx1"/>
+                          </a:solidFill>
+                        </a:rPr>
+                        <a:t>Analyses + categorises + visualises spending </a:t>
+                      </a:r>
+                      <a:r>
+                        <a:rPr lang="en-GB" i="1" dirty="0">
+                          <a:solidFill>
+                            <a:schemeClr val="tx1"/>
+                          </a:solidFill>
+                        </a:rPr>
+                        <a:t>(AI classification, </a:t>
+                      </a:r>
+                      <a:r>
+                        <a:rPr lang="en-GB" i="1" dirty="0" err="1">
+                          <a:solidFill>
+                            <a:schemeClr val="tx1"/>
+                          </a:solidFill>
+                        </a:rPr>
+                        <a:t>ChartJS</a:t>
+                      </a:r>
+                      <a:r>
+                        <a:rPr lang="en-GB" i="1" dirty="0">
+                          <a:solidFill>
+                            <a:schemeClr val="tx1"/>
+                          </a:solidFill>
+                        </a:rPr>
+                        <a:t>)</a:t>
+                      </a:r>
+                    </a:p>
+                    <a:p>
+                      <a:pPr marL="285750" indent="-285750">
+                        <a:buFont typeface="Arial" panose="020B0604020202020204" pitchFamily="34" charset="0"/>
+                        <a:buChar char="•"/>
+                      </a:pPr>
+                      <a:r>
+                        <a:rPr lang="en-GB" i="0" dirty="0">
+                          <a:solidFill>
+                            <a:schemeClr val="tx1"/>
+                          </a:solidFill>
+                        </a:rPr>
+                        <a:t>Totals + visualises (by bank or account type) net worth across platforms</a:t>
+                      </a:r>
+                    </a:p>
+                    <a:p>
+                      <a:pPr marL="285750" indent="-285750">
+                        <a:buFont typeface="Arial" panose="020B0604020202020204" pitchFamily="34" charset="0"/>
+                        <a:buChar char="•"/>
+                      </a:pPr>
+                      <a:r>
+                        <a:rPr lang="en-GB" i="0" dirty="0">
+                          <a:solidFill>
+                            <a:schemeClr val="tx1"/>
+                          </a:solidFill>
+                        </a:rPr>
+                        <a:t>Suggests + visualises personalised budget based on spending, income and financial situation </a:t>
+                      </a:r>
+                      <a:r>
+                        <a:rPr lang="en-GB" i="1" dirty="0">
+                          <a:solidFill>
+                            <a:schemeClr val="tx1"/>
+                          </a:solidFill>
+                        </a:rPr>
+                        <a:t>(</a:t>
+                      </a:r>
+                      <a:r>
+                        <a:rPr lang="en-GB" i="1" dirty="0" err="1">
+                          <a:solidFill>
+                            <a:schemeClr val="tx1"/>
+                          </a:solidFill>
+                        </a:rPr>
+                        <a:t>ChartJS</a:t>
+                      </a:r>
+                      <a:r>
+                        <a:rPr lang="en-GB" i="1" dirty="0">
+                          <a:solidFill>
+                            <a:schemeClr val="tx1"/>
+                          </a:solidFill>
+                        </a:rPr>
+                        <a:t>, AI data processing)</a:t>
+                      </a:r>
+                    </a:p>
+                    <a:p>
+                      <a:pPr marL="285750" indent="-285750">
+                        <a:buFont typeface="Arial" panose="020B0604020202020204" pitchFamily="34" charset="0"/>
+                        <a:buChar char="•"/>
+                      </a:pPr>
+                      <a:r>
+                        <a:rPr lang="en-GB" i="0" dirty="0">
+                          <a:solidFill>
+                            <a:schemeClr val="tx1"/>
+                          </a:solidFill>
+                        </a:rPr>
+                        <a:t>Suggests relevant reliable resources based on financial needs</a:t>
+                      </a:r>
+                    </a:p>
+                    <a:p>
+                      <a:pPr marL="285750" indent="-285750">
+                        <a:buFont typeface="Arial" panose="020B0604020202020204" pitchFamily="34" charset="0"/>
+                        <a:buChar char="•"/>
+                      </a:pPr>
+                      <a:r>
+                        <a:rPr lang="en-GB" i="0" dirty="0">
+                          <a:solidFill>
+                            <a:schemeClr val="tx1"/>
+                          </a:solidFill>
+                        </a:rPr>
+                        <a:t>Eliminates needs for messy spreadsheets or many disjointed mobile banks</a:t>
+                      </a:r>
+                    </a:p>
+                  </a:txBody>
+                  <a:tcPr/>
+                </a:tc>
+                <a:tc hMerge="1">
+                  <a:txBody>
+                    <a:bodyPr/>
+                    <a:lstStyle/>
+                    <a:p>
+                      <a:endParaRPr lang="en-GB"/>
+                    </a:p>
+                  </a:txBody>
+                  <a:tcPr/>
+                </a:tc>
+                <a:tc hMerge="1">
+                  <a:txBody>
+                    <a:bodyPr/>
+                    <a:lstStyle/>
+                    <a:p>
+                      <a:endParaRPr lang="en-GB" dirty="0"/>
+                    </a:p>
+                  </a:txBody>
+                  <a:tcPr/>
+                </a:tc>
+                <a:extLst>
+                  <a:ext uri="{0D108BD9-81ED-4DB2-BD59-A6C34878D82A}">
+                    <a16:rowId xmlns:a16="http://schemas.microsoft.com/office/drawing/2014/main" val="1881909619"/>
+                  </a:ext>
+                </a:extLst>
+              </a:tr>
+              <a:tr h="234636">
+                <a:tc>
+                  <a:txBody>
+                    <a:bodyPr/>
+                    <a:lstStyle/>
+                    <a:p>
+                      <a:pPr algn="just"/>
+                      <a:r>
+                        <a:rPr lang="en-GB" sz="1800" b="1" i="0" u="none" kern="1200" dirty="0">
+                          <a:solidFill>
+                            <a:schemeClr val="tx1"/>
+                          </a:solidFill>
+                          <a:latin typeface="+mn-lt"/>
+                          <a:ea typeface="+mn-ea"/>
+                          <a:cs typeface="+mn-cs"/>
+                        </a:rPr>
+                        <a:t>Audience </a:t>
+                      </a:r>
+                      <a:r>
+                        <a:rPr lang="en-GB" sz="1800" b="0" i="1" u="none" kern="1200" dirty="0">
+                          <a:solidFill>
+                            <a:schemeClr val="tx1"/>
+                          </a:solidFill>
+                          <a:latin typeface="+mn-lt"/>
+                          <a:ea typeface="+mn-ea"/>
+                          <a:cs typeface="+mn-cs"/>
+                        </a:rPr>
+                        <a:t>(why they care)</a:t>
+                      </a:r>
+                      <a:endParaRPr lang="en-GB" sz="1800" b="0" i="1" kern="1200" dirty="0">
+                        <a:solidFill>
+                          <a:schemeClr val="tx1"/>
+                        </a:solidFill>
+                        <a:latin typeface="+mn-lt"/>
+                        <a:ea typeface="+mn-ea"/>
+                        <a:cs typeface="+mn-cs"/>
+                      </a:endParaRPr>
+                    </a:p>
+                  </a:txBody>
+                  <a:tcPr/>
+                </a:tc>
+                <a:tc>
+                  <a:txBody>
+                    <a:bodyPr/>
+                    <a:lstStyle/>
+                    <a:p>
+                      <a:r>
+                        <a:rPr lang="en-GB" sz="1800" b="1" kern="1200" dirty="0">
+                          <a:solidFill>
+                            <a:schemeClr val="tx1"/>
+                          </a:solidFill>
+                          <a:latin typeface="+mn-lt"/>
+                          <a:ea typeface="+mn-ea"/>
+                          <a:cs typeface="+mn-cs"/>
+                        </a:rPr>
+                        <a:t>Research</a:t>
+                      </a:r>
+                    </a:p>
+                  </a:txBody>
+                  <a:tcPr/>
+                </a:tc>
+                <a:tc>
+                  <a:txBody>
+                    <a:bodyPr/>
+                    <a:lstStyle/>
+                    <a:p>
+                      <a:r>
+                        <a:rPr lang="en-GB" sz="1800" b="1" kern="1200" dirty="0">
+                          <a:solidFill>
+                            <a:schemeClr val="tx1"/>
+                          </a:solidFill>
+                          <a:latin typeface="+mn-lt"/>
+                          <a:ea typeface="+mn-ea"/>
+                          <a:cs typeface="+mn-cs"/>
+                        </a:rPr>
+                        <a:t>Marketing </a:t>
+                      </a:r>
+                      <a:r>
+                        <a:rPr lang="en-GB" sz="1800" b="0" i="1" kern="1200" dirty="0">
+                          <a:solidFill>
+                            <a:schemeClr val="tx1"/>
+                          </a:solidFill>
+                          <a:latin typeface="+mn-lt"/>
+                          <a:ea typeface="+mn-ea"/>
+                          <a:cs typeface="+mn-cs"/>
+                        </a:rPr>
+                        <a:t>(targeted)</a:t>
+                      </a:r>
+                      <a:endParaRPr lang="en-GB" sz="1800" b="1" kern="1200" dirty="0">
+                        <a:solidFill>
+                          <a:schemeClr val="tx1"/>
+                        </a:solidFill>
+                        <a:latin typeface="+mn-lt"/>
+                        <a:ea typeface="+mn-ea"/>
+                        <a:cs typeface="+mn-cs"/>
+                      </a:endParaRPr>
+                    </a:p>
+                  </a:txBody>
+                  <a:tcPr/>
+                </a:tc>
+                <a:tc>
+                  <a:txBody>
+                    <a:bodyPr/>
+                    <a:lstStyle/>
+                    <a:p>
+                      <a:r>
+                        <a:rPr lang="en-GB" b="1" dirty="0">
+                          <a:solidFill>
+                            <a:schemeClr val="tx1"/>
+                          </a:solidFill>
+                        </a:rPr>
+                        <a:t>Monetization</a:t>
+                      </a:r>
+                      <a:endParaRPr lang="en-GB" sz="1800" b="0" kern="1200" dirty="0">
+                        <a:solidFill>
+                          <a:schemeClr val="tx1"/>
+                        </a:solidFill>
+                        <a:latin typeface="+mn-lt"/>
+                        <a:ea typeface="+mn-ea"/>
+                        <a:cs typeface="+mn-cs"/>
+                      </a:endParaRPr>
+                    </a:p>
+                  </a:txBody>
+                  <a:tcPr/>
+                </a:tc>
+                <a:extLst>
+                  <a:ext uri="{0D108BD9-81ED-4DB2-BD59-A6C34878D82A}">
+                    <a16:rowId xmlns:a16="http://schemas.microsoft.com/office/drawing/2014/main" val="797552020"/>
+                  </a:ext>
+                </a:extLst>
+              </a:tr>
+              <a:tr h="2651079">
+                <a:tc>
+                  <a:txBody>
+                    <a:bodyPr/>
+                    <a:lstStyle/>
+                    <a:p>
+                      <a:r>
+                        <a:rPr lang="en-GB" sz="1800" b="0" u="sng" kern="1200" dirty="0">
+                          <a:solidFill>
+                            <a:schemeClr val="tx1"/>
+                          </a:solidFill>
+                          <a:latin typeface="+mn-lt"/>
+                          <a:ea typeface="+mn-ea"/>
+                          <a:cs typeface="+mn-cs"/>
+                        </a:rPr>
+                        <a:t>Students &amp; low-income:</a:t>
+                      </a:r>
+                    </a:p>
+                    <a:p>
+                      <a:r>
+                        <a:rPr lang="en-GB" sz="1800" b="0" u="none" kern="1200" dirty="0">
+                          <a:solidFill>
+                            <a:schemeClr val="tx1"/>
+                          </a:solidFill>
+                          <a:latin typeface="+mn-lt"/>
+                          <a:ea typeface="+mn-ea"/>
+                          <a:cs typeface="+mn-cs"/>
+                        </a:rPr>
+                        <a:t>Hard to track &amp; control spending</a:t>
+                      </a:r>
+                    </a:p>
+                    <a:p>
+                      <a:r>
+                        <a:rPr lang="en-GB" sz="1800" b="0" u="none" kern="1200" dirty="0">
+                          <a:solidFill>
+                            <a:schemeClr val="tx1"/>
+                          </a:solidFill>
+                          <a:latin typeface="+mn-lt"/>
+                          <a:ea typeface="+mn-ea"/>
+                          <a:cs typeface="+mn-cs"/>
+                        </a:rPr>
+                        <a:t>Timely, boring and hard to budget</a:t>
+                      </a:r>
+                    </a:p>
+                    <a:p>
+                      <a:r>
+                        <a:rPr lang="en-GB" sz="1800" b="0" i="1" u="none" kern="1200" dirty="0">
+                          <a:solidFill>
+                            <a:schemeClr val="tx1"/>
+                          </a:solidFill>
+                          <a:latin typeface="+mn-lt"/>
+                          <a:ea typeface="+mn-ea"/>
+                          <a:cs typeface="+mn-cs"/>
+                        </a:rPr>
+                        <a:t>Short for money</a:t>
+                      </a:r>
+                    </a:p>
+                    <a:p>
+                      <a:r>
+                        <a:rPr lang="en-GB" sz="1800" b="0" u="sng" kern="1200" dirty="0">
+                          <a:solidFill>
+                            <a:schemeClr val="tx1"/>
+                          </a:solidFill>
+                          <a:latin typeface="+mn-lt"/>
+                          <a:ea typeface="+mn-ea"/>
+                          <a:cs typeface="+mn-cs"/>
+                        </a:rPr>
+                        <a:t>Higher income/savings:</a:t>
+                      </a:r>
+                    </a:p>
+                    <a:p>
+                      <a:r>
+                        <a:rPr lang="en-GB" sz="1800" b="0" u="none" kern="1200" dirty="0">
+                          <a:solidFill>
+                            <a:schemeClr val="tx1"/>
+                          </a:solidFill>
+                          <a:latin typeface="+mn-lt"/>
+                          <a:ea typeface="+mn-ea"/>
+                          <a:cs typeface="+mn-cs"/>
+                        </a:rPr>
+                        <a:t>Wealth scattered across accounts + providers</a:t>
+                      </a:r>
+                    </a:p>
+                    <a:p>
+                      <a:r>
+                        <a:rPr lang="en-GB" sz="1800" b="0" u="none" kern="1200" dirty="0">
+                          <a:solidFill>
+                            <a:schemeClr val="tx1"/>
+                          </a:solidFill>
+                          <a:latin typeface="+mn-lt"/>
+                          <a:ea typeface="+mn-ea"/>
+                          <a:cs typeface="+mn-cs"/>
+                        </a:rPr>
+                        <a:t>Money left sitting in low-interest accounts</a:t>
+                      </a:r>
+                    </a:p>
+                    <a:p>
+                      <a:r>
+                        <a:rPr lang="en-GB" sz="1800" b="0" i="1" u="none" kern="1200" dirty="0">
+                          <a:solidFill>
+                            <a:schemeClr val="tx1"/>
+                          </a:solidFill>
+                          <a:latin typeface="+mn-lt"/>
+                          <a:ea typeface="+mn-ea"/>
+                          <a:cs typeface="+mn-cs"/>
+                        </a:rPr>
+                        <a:t>Stressed/confused</a:t>
+                      </a:r>
+                    </a:p>
+                  </a:txBody>
+                  <a:tcPr/>
+                </a:tc>
+                <a:tc>
+                  <a:txBody>
+                    <a:bodyPr/>
+                    <a:lstStyle/>
+                    <a:p>
+                      <a:pPr marL="0" indent="0">
+                        <a:buFont typeface="Arial" panose="020B0604020202020204" pitchFamily="34" charset="0"/>
+                        <a:buNone/>
+                      </a:pPr>
+                      <a:r>
+                        <a:rPr lang="en-GB" u="sng" dirty="0">
+                          <a:solidFill>
+                            <a:schemeClr val="tx1"/>
+                          </a:solidFill>
+                        </a:rPr>
+                        <a:t>Students:</a:t>
+                      </a:r>
+                      <a:r>
+                        <a:rPr lang="en-GB" dirty="0">
+                          <a:solidFill>
+                            <a:schemeClr val="tx1"/>
+                          </a:solidFill>
+                        </a:rPr>
+                        <a:t> categorise spending and increase saving, plan for loans.</a:t>
+                      </a:r>
+                    </a:p>
+                    <a:p>
+                      <a:pPr marL="0" indent="0">
+                        <a:buFont typeface="Arial" panose="020B0604020202020204" pitchFamily="34" charset="0"/>
+                        <a:buNone/>
+                      </a:pPr>
+                      <a:r>
+                        <a:rPr lang="en-GB" u="sng" dirty="0">
+                          <a:solidFill>
+                            <a:schemeClr val="tx1"/>
+                          </a:solidFill>
+                        </a:rPr>
+                        <a:t>High savings: </a:t>
+                      </a:r>
+                      <a:r>
+                        <a:rPr lang="en-GB" u="none" dirty="0">
+                          <a:solidFill>
+                            <a:schemeClr val="tx1"/>
+                          </a:solidFill>
+                        </a:rPr>
+                        <a:t>e.g. Mum, hard to track ££</a:t>
+                      </a:r>
+                      <a:endParaRPr lang="en-GB" u="sng" dirty="0">
+                        <a:solidFill>
+                          <a:schemeClr val="tx1"/>
+                        </a:solidFill>
+                      </a:endParaRPr>
+                    </a:p>
+                    <a:p>
+                      <a:pPr marL="0" indent="0">
+                        <a:buFont typeface="Arial" panose="020B0604020202020204" pitchFamily="34" charset="0"/>
+                        <a:buNone/>
+                      </a:pPr>
+                      <a:r>
+                        <a:rPr lang="en-GB" u="sng" dirty="0">
+                          <a:solidFill>
+                            <a:schemeClr val="tx1"/>
+                          </a:solidFill>
+                        </a:rPr>
+                        <a:t>Competitors:</a:t>
+                      </a:r>
+                      <a:r>
+                        <a:rPr lang="en-GB" u="none" dirty="0">
+                          <a:solidFill>
+                            <a:schemeClr val="tx1"/>
+                          </a:solidFill>
+                        </a:rPr>
+                        <a:t> </a:t>
+                      </a:r>
+                      <a:r>
+                        <a:rPr lang="en-GB" dirty="0" err="1">
+                          <a:solidFill>
+                            <a:schemeClr val="tx1"/>
+                          </a:solidFill>
+                        </a:rPr>
+                        <a:t>Revolut</a:t>
+                      </a:r>
+                      <a:r>
+                        <a:rPr lang="en-GB" dirty="0">
+                          <a:solidFill>
+                            <a:schemeClr val="tx1"/>
+                          </a:solidFill>
+                        </a:rPr>
+                        <a:t> /Mobile Banks: limited within own platform. YNAB: Confusing, no tailored suggestions, but some overlaps</a:t>
+                      </a:r>
+                    </a:p>
+                  </a:txBody>
+                  <a:tcPr/>
+                </a:tc>
+                <a:tc>
+                  <a:txBody>
+                    <a:bodyPr/>
+                    <a:lstStyle/>
+                    <a:p>
+                      <a:r>
+                        <a:rPr lang="en-GB" sz="1800" b="0" u="sng" kern="1200" dirty="0">
+                          <a:solidFill>
+                            <a:schemeClr val="tx1"/>
+                          </a:solidFill>
+                          <a:latin typeface="+mn-lt"/>
+                          <a:ea typeface="+mn-ea"/>
+                          <a:cs typeface="+mn-cs"/>
+                        </a:rPr>
+                        <a:t>Students &amp; low-income:</a:t>
+                      </a:r>
+                    </a:p>
+                    <a:p>
+                      <a:pPr marL="285750" indent="-285750">
+                        <a:buFont typeface="Arial" panose="020B0604020202020204" pitchFamily="34" charset="0"/>
+                        <a:buChar char="•"/>
+                      </a:pPr>
+                      <a:r>
+                        <a:rPr lang="en-GB" sz="1800" b="0" i="0" u="none" kern="1200" dirty="0">
+                          <a:solidFill>
+                            <a:schemeClr val="tx1"/>
+                          </a:solidFill>
+                          <a:latin typeface="+mn-lt"/>
+                          <a:ea typeface="+mn-ea"/>
+                          <a:cs typeface="+mn-cs"/>
+                        </a:rPr>
+                        <a:t>Uni events (e.g. freshers)</a:t>
+                      </a:r>
+                    </a:p>
+                    <a:p>
+                      <a:pPr marL="285750" indent="-285750">
+                        <a:buFont typeface="Arial" panose="020B0604020202020204" pitchFamily="34" charset="0"/>
+                        <a:buChar char="•"/>
+                      </a:pPr>
+                      <a:r>
+                        <a:rPr lang="en-GB" sz="1800" b="0" i="0" u="none" kern="1200" dirty="0">
+                          <a:solidFill>
+                            <a:schemeClr val="tx1"/>
+                          </a:solidFill>
+                          <a:latin typeface="+mn-lt"/>
+                          <a:ea typeface="+mn-ea"/>
+                          <a:cs typeface="+mn-cs"/>
+                        </a:rPr>
+                        <a:t>Instagram/TT</a:t>
+                      </a:r>
+                    </a:p>
+                    <a:p>
+                      <a:r>
+                        <a:rPr lang="en-GB" sz="1800" b="0" i="1" u="none" kern="1200" dirty="0">
+                          <a:solidFill>
+                            <a:schemeClr val="tx1"/>
+                          </a:solidFill>
+                          <a:latin typeface="+mn-lt"/>
+                          <a:ea typeface="+mn-ea"/>
+                          <a:cs typeface="+mn-cs"/>
+                        </a:rPr>
+                        <a:t>Save money</a:t>
+                      </a:r>
+                    </a:p>
+                    <a:p>
+                      <a:r>
+                        <a:rPr lang="en-GB" sz="1800" b="0" u="sng" kern="1200" dirty="0">
+                          <a:solidFill>
+                            <a:schemeClr val="tx1"/>
+                          </a:solidFill>
+                          <a:latin typeface="+mn-lt"/>
+                          <a:ea typeface="+mn-ea"/>
+                          <a:cs typeface="+mn-cs"/>
+                        </a:rPr>
+                        <a:t>Higher income/savings:</a:t>
+                      </a:r>
+                    </a:p>
+                    <a:p>
+                      <a:pPr marL="285750" indent="-285750">
+                        <a:buFont typeface="Arial" panose="020B0604020202020204" pitchFamily="34" charset="0"/>
+                        <a:buChar char="•"/>
+                      </a:pPr>
+                      <a:r>
+                        <a:rPr lang="en-GB" sz="1800" b="0" i="0" u="none" kern="1200" dirty="0">
+                          <a:solidFill>
+                            <a:schemeClr val="tx1"/>
+                          </a:solidFill>
+                          <a:latin typeface="+mn-lt"/>
+                          <a:ea typeface="+mn-ea"/>
+                          <a:cs typeface="+mn-cs"/>
+                        </a:rPr>
+                        <a:t>Newspapers</a:t>
+                      </a:r>
+                    </a:p>
+                    <a:p>
+                      <a:pPr marL="285750" indent="-285750">
+                        <a:buFont typeface="Arial" panose="020B0604020202020204" pitchFamily="34" charset="0"/>
+                        <a:buChar char="•"/>
+                      </a:pPr>
+                      <a:r>
+                        <a:rPr lang="en-GB" sz="1800" b="0" i="0" u="none" kern="1200" dirty="0">
+                          <a:solidFill>
+                            <a:schemeClr val="tx1"/>
+                          </a:solidFill>
+                          <a:latin typeface="+mn-lt"/>
+                          <a:ea typeface="+mn-ea"/>
+                          <a:cs typeface="+mn-cs"/>
+                        </a:rPr>
+                        <a:t>Blogs (e.g. MSE)</a:t>
+                      </a:r>
+                    </a:p>
+                    <a:p>
+                      <a:pPr marL="285750" indent="-285750">
+                        <a:buFont typeface="Arial" panose="020B0604020202020204" pitchFamily="34" charset="0"/>
+                        <a:buChar char="•"/>
+                      </a:pPr>
+                      <a:r>
+                        <a:rPr lang="en-GB" sz="1800" b="0" i="0" u="none" kern="1200" dirty="0">
+                          <a:solidFill>
+                            <a:schemeClr val="tx1"/>
+                          </a:solidFill>
+                          <a:latin typeface="+mn-lt"/>
+                          <a:ea typeface="+mn-ea"/>
+                          <a:cs typeface="+mn-cs"/>
+                        </a:rPr>
+                        <a:t>Facebook</a:t>
+                      </a:r>
+                    </a:p>
+                    <a:p>
+                      <a:r>
+                        <a:rPr lang="en-GB" sz="1800" b="0" i="1" u="none" kern="1200" dirty="0">
+                          <a:solidFill>
+                            <a:schemeClr val="tx1"/>
+                          </a:solidFill>
+                          <a:latin typeface="+mn-lt"/>
+                          <a:ea typeface="+mn-ea"/>
+                          <a:cs typeface="+mn-cs"/>
+                        </a:rPr>
+                        <a:t>Control wealth and make it work for you</a:t>
+                      </a:r>
+                      <a:endParaRPr lang="en-GB" sz="1800" b="0" u="none" kern="1200" dirty="0">
+                        <a:solidFill>
+                          <a:schemeClr val="tx1"/>
+                        </a:solidFill>
+                        <a:latin typeface="+mn-lt"/>
+                        <a:ea typeface="+mn-ea"/>
+                        <a:cs typeface="+mn-cs"/>
+                      </a:endParaRPr>
+                    </a:p>
+                  </a:txBody>
+                  <a:tcPr/>
+                </a:tc>
+                <a:tc>
+                  <a:txBody>
+                    <a:bodyPr/>
+                    <a:lstStyle/>
+                    <a:p>
+                      <a:pPr marL="0" indent="0">
+                        <a:buFont typeface="Arial" panose="020B0604020202020204" pitchFamily="34" charset="0"/>
+                        <a:buNone/>
+                      </a:pPr>
+                      <a:r>
+                        <a:rPr lang="en-GB" u="sng" dirty="0">
+                          <a:solidFill>
+                            <a:schemeClr val="tx1"/>
+                          </a:solidFill>
+                        </a:rPr>
+                        <a:t>Free preview:</a:t>
+                      </a:r>
+                      <a:r>
+                        <a:rPr lang="en-GB" u="none" dirty="0">
+                          <a:solidFill>
+                            <a:schemeClr val="tx1"/>
+                          </a:solidFill>
+                        </a:rPr>
+                        <a:t> </a:t>
+                      </a:r>
+                      <a:r>
+                        <a:rPr lang="en-GB" dirty="0">
+                          <a:solidFill>
+                            <a:schemeClr val="tx1"/>
+                          </a:solidFill>
+                        </a:rPr>
+                        <a:t>Budget tool, demo (fake data) of rest</a:t>
+                      </a:r>
+                    </a:p>
+                    <a:p>
+                      <a:pPr marL="0" indent="0">
+                        <a:buFont typeface="Arial" panose="020B0604020202020204" pitchFamily="34" charset="0"/>
+                        <a:buNone/>
+                      </a:pPr>
+                      <a:r>
+                        <a:rPr lang="en-GB" u="sng" dirty="0">
+                          <a:solidFill>
+                            <a:schemeClr val="tx1"/>
+                          </a:solidFill>
+                        </a:rPr>
+                        <a:t>Monthly subscription:</a:t>
+                      </a:r>
+                    </a:p>
+                    <a:p>
+                      <a:pPr marL="0" indent="0">
+                        <a:buFont typeface="Arial" panose="020B0604020202020204" pitchFamily="34" charset="0"/>
+                        <a:buNone/>
+                      </a:pPr>
+                      <a:r>
+                        <a:rPr lang="en-GB" u="none" dirty="0">
+                          <a:solidFill>
+                            <a:schemeClr val="tx1"/>
+                          </a:solidFill>
+                        </a:rPr>
+                        <a:t>≈£9.99/</a:t>
+                      </a:r>
+                      <a:r>
+                        <a:rPr lang="en-GB" u="none" dirty="0" err="1">
+                          <a:solidFill>
+                            <a:schemeClr val="tx1"/>
+                          </a:solidFill>
+                        </a:rPr>
+                        <a:t>mo</a:t>
+                      </a:r>
+                      <a:endParaRPr lang="en-GB" u="none" dirty="0">
+                        <a:solidFill>
+                          <a:schemeClr val="tx1"/>
+                        </a:solidFill>
+                      </a:endParaRPr>
+                    </a:p>
+                    <a:p>
+                      <a:pPr marL="0" indent="0">
+                        <a:buFont typeface="Arial" panose="020B0604020202020204" pitchFamily="34" charset="0"/>
+                        <a:buNone/>
+                      </a:pPr>
+                      <a:r>
+                        <a:rPr lang="en-GB" u="sng" dirty="0">
+                          <a:solidFill>
+                            <a:schemeClr val="tx1"/>
+                          </a:solidFill>
+                        </a:rPr>
+                        <a:t>Sponsors:</a:t>
+                      </a:r>
+                      <a:r>
+                        <a:rPr lang="en-GB" u="none" dirty="0">
+                          <a:solidFill>
+                            <a:schemeClr val="tx1"/>
+                          </a:solidFill>
+                        </a:rPr>
+                        <a:t> credit agencies, savings/pension/mortgage providers, premium advertising audience</a:t>
+                      </a:r>
+                    </a:p>
+                  </a:txBody>
+                  <a:tcPr/>
+                </a:tc>
+                <a:extLst>
+                  <a:ext uri="{0D108BD9-81ED-4DB2-BD59-A6C34878D82A}">
+                    <a16:rowId xmlns:a16="http://schemas.microsoft.com/office/drawing/2014/main" val="1447385067"/>
+                  </a:ext>
+                </a:extLst>
+              </a:tr>
+            </a:tbl>
+          </a:graphicData>
+        </a:graphic>
+      </p:graphicFrame>
+    </p:spTree>
+    <p:extLst>
+      <p:ext uri="{BB962C8B-B14F-4D97-AF65-F5344CB8AC3E}">
+        <p14:creationId xmlns:p14="http://schemas.microsoft.com/office/powerpoint/2010/main" val="1832341227"/>
+      </p:ext>
+    </p:extLst>
+  </p:cSld>
+  <p:clrMapOvr>
+    <a:masterClrMapping/>
+  </p:clrMapOvr>
+</p:sld>
+</file>
+
+<file path=ppt/slides/slide4.xml><?xml version="1.0" encoding="utf-8"?>
+<p:sld xmlns:a="http://schemas.openxmlformats.org/drawingml/2006/main" xmlns:r="http://schemas.openxmlformats.org/officeDocument/2006/relationships" xmlns:p="http://schemas.openxmlformats.org/presentationml/2006/main">
+  <p:cSld>
+    <p:spTree>
+      <p:nvGrpSpPr>
+        <p:cNvPr id="1" name=""/>
+        <p:cNvGrpSpPr/>
+        <p:nvPr/>
+      </p:nvGrpSpPr>
+      <p:grpSpPr>
+        <a:xfrm>
+          <a:off x="0" y="0"/>
+          <a:ext cx="0" cy="0"/>
+          <a:chOff x="0" y="0"/>
+          <a:chExt cx="0" cy="0"/>
+        </a:xfrm>
+      </p:grpSpPr>
+      <p:pic>
+        <p:nvPicPr>
+          <p:cNvPr id="9" name="Picture 8" descr="A purple circle with white text&#10;&#10;Description automatically generated">
+            <a:extLst>
+              <a:ext uri="{FF2B5EF4-FFF2-40B4-BE49-F238E27FC236}">
+                <a16:creationId xmlns:a16="http://schemas.microsoft.com/office/drawing/2014/main" id="{F8B46597-2577-0B59-D0B4-6A35F3DE90C1}"/>
+              </a:ext>
+            </a:extLst>
+          </p:cNvPr>
+          <p:cNvPicPr>
+            <a:picLocks noChangeAspect="1"/>
+          </p:cNvPicPr>
+          <p:nvPr/>
+        </p:nvPicPr>
+        <p:blipFill>
+          <a:blip r:embed="rId2"/>
+          <a:stretch>
+            <a:fillRect/>
+          </a:stretch>
+        </p:blipFill>
+        <p:spPr>
+          <a:xfrm>
+            <a:off x="0" y="0"/>
+            <a:ext cx="1043673" cy="1043673"/>
+          </a:xfrm>
+          <a:prstGeom prst="rect">
+            <a:avLst/>
+          </a:prstGeom>
+          <a:solidFill>
+            <a:schemeClr val="bg1"/>
+          </a:solidFill>
+        </p:spPr>
+      </p:pic>
+      <p:sp>
+        <p:nvSpPr>
+          <p:cNvPr id="7" name="TextBox 6">
+            <a:extLst>
+              <a:ext uri="{FF2B5EF4-FFF2-40B4-BE49-F238E27FC236}">
+                <a16:creationId xmlns:a16="http://schemas.microsoft.com/office/drawing/2014/main" id="{3EB1707E-BA34-AC8E-5B26-9E892D463A8E}"/>
+              </a:ext>
+            </a:extLst>
+          </p:cNvPr>
+          <p:cNvSpPr txBox="1"/>
+          <p:nvPr/>
+        </p:nvSpPr>
+        <p:spPr>
+          <a:xfrm>
+            <a:off x="838200" y="843280"/>
+            <a:ext cx="4038600" cy="4247317"/>
+          </a:xfrm>
+          <a:prstGeom prst="rect">
+            <a:avLst/>
+          </a:prstGeom>
+          <a:noFill/>
+        </p:spPr>
+        <p:txBody>
+          <a:bodyPr wrap="square" rtlCol="0">
+            <a:spAutoFit/>
+          </a:bodyPr>
+          <a:lstStyle/>
+          <a:p>
+            <a:r>
+              <a:rPr lang="en-GB" b="1" dirty="0"/>
+              <a:t>Future Potential</a:t>
+            </a:r>
+          </a:p>
+          <a:p>
+            <a:pPr marL="285750" indent="-285750">
+              <a:buFont typeface="Arial" panose="020B0604020202020204" pitchFamily="34" charset="0"/>
+              <a:buChar char="•"/>
+            </a:pPr>
+            <a:r>
+              <a:rPr lang="en-GB" dirty="0"/>
+              <a:t>Monetise: Link to credit platforms</a:t>
+            </a:r>
+          </a:p>
+          <a:p>
+            <a:pPr marL="742950" lvl="1" indent="-285750">
+              <a:buFont typeface="Arial" panose="020B0604020202020204" pitchFamily="34" charset="0"/>
+              <a:buChar char="•"/>
+            </a:pPr>
+            <a:r>
+              <a:rPr lang="en-GB" dirty="0"/>
+              <a:t>e.g. </a:t>
+            </a:r>
+            <a:r>
+              <a:rPr lang="en-GB" dirty="0" err="1"/>
+              <a:t>ClearScore</a:t>
+            </a:r>
+            <a:endParaRPr lang="en-GB" dirty="0"/>
+          </a:p>
+          <a:p>
+            <a:pPr marL="742950" lvl="1" indent="-285750">
+              <a:buFont typeface="Arial" panose="020B0604020202020204" pitchFamily="34" charset="0"/>
+              <a:buChar char="•"/>
+            </a:pPr>
+            <a:r>
+              <a:rPr lang="en-GB" dirty="0"/>
+              <a:t>Directly provides affordability reports</a:t>
+            </a:r>
+          </a:p>
+          <a:p>
+            <a:pPr marL="742950" lvl="1" indent="-285750">
+              <a:buFont typeface="Arial" panose="020B0604020202020204" pitchFamily="34" charset="0"/>
+              <a:buChar char="•"/>
+            </a:pPr>
+            <a:r>
+              <a:rPr lang="en-GB" dirty="0"/>
+              <a:t>Hence better personalised credit/lending offers</a:t>
+            </a:r>
+          </a:p>
+          <a:p>
+            <a:pPr marL="742950" lvl="1" indent="-285750">
+              <a:buFont typeface="Arial" panose="020B0604020202020204" pitchFamily="34" charset="0"/>
+              <a:buChar char="•"/>
+            </a:pPr>
+            <a:r>
+              <a:rPr lang="en-GB" dirty="0"/>
+              <a:t>Affiliate</a:t>
+            </a:r>
+          </a:p>
+          <a:p>
+            <a:pPr marL="285750" indent="-285750">
+              <a:buFont typeface="Arial" panose="020B0604020202020204" pitchFamily="34" charset="0"/>
+              <a:buChar char="•"/>
+            </a:pPr>
+            <a:r>
+              <a:rPr lang="en-GB" dirty="0"/>
+              <a:t>Monetise: Link to saving providers</a:t>
+            </a:r>
+          </a:p>
+          <a:p>
+            <a:pPr marL="742950" lvl="1" indent="-285750">
+              <a:buFont typeface="Arial" panose="020B0604020202020204" pitchFamily="34" charset="0"/>
+              <a:buChar char="•"/>
+            </a:pPr>
+            <a:r>
+              <a:rPr lang="en-GB" dirty="0"/>
+              <a:t>Suggests relevant savings accounts/bonds etc.</a:t>
+            </a:r>
+          </a:p>
+          <a:p>
+            <a:pPr marL="742950" lvl="1" indent="-285750">
+              <a:buFont typeface="Arial" panose="020B0604020202020204" pitchFamily="34" charset="0"/>
+              <a:buChar char="•"/>
+            </a:pPr>
+            <a:r>
+              <a:rPr lang="en-GB" dirty="0"/>
+              <a:t>Affiliate</a:t>
+            </a:r>
+          </a:p>
+          <a:p>
+            <a:pPr marL="285750" indent="-285750">
+              <a:buFont typeface="Arial" panose="020B0604020202020204" pitchFamily="34" charset="0"/>
+              <a:buChar char="•"/>
+            </a:pPr>
+            <a:r>
+              <a:rPr lang="en-GB" dirty="0"/>
+              <a:t>Mobile App</a:t>
+            </a:r>
+          </a:p>
+          <a:p>
+            <a:pPr marL="742950" lvl="1" indent="-285750">
+              <a:buFont typeface="Arial" panose="020B0604020202020204" pitchFamily="34" charset="0"/>
+              <a:buChar char="•"/>
+            </a:pPr>
+            <a:r>
+              <a:rPr lang="en-GB" dirty="0"/>
+              <a:t>Track spending on the go</a:t>
+            </a:r>
+          </a:p>
+          <a:p>
+            <a:pPr marL="742950" lvl="1" indent="-285750">
+              <a:buFont typeface="Arial" panose="020B0604020202020204" pitchFamily="34" charset="0"/>
+              <a:buChar char="•"/>
+            </a:pPr>
+            <a:r>
+              <a:rPr lang="en-GB" dirty="0"/>
+              <a:t>Compare spending to budget</a:t>
+            </a:r>
+          </a:p>
+        </p:txBody>
+      </p:sp>
+      <p:sp>
+        <p:nvSpPr>
+          <p:cNvPr id="8" name="Title 1">
+            <a:extLst>
+              <a:ext uri="{FF2B5EF4-FFF2-40B4-BE49-F238E27FC236}">
+                <a16:creationId xmlns:a16="http://schemas.microsoft.com/office/drawing/2014/main" id="{A9E3D6DD-5D8F-F75C-D450-720D0D5715D6}"/>
+              </a:ext>
+            </a:extLst>
+          </p:cNvPr>
+          <p:cNvSpPr txBox="1">
+            <a:spLocks/>
+          </p:cNvSpPr>
+          <p:nvPr/>
+        </p:nvSpPr>
+        <p:spPr>
+          <a:xfrm>
+            <a:off x="7250229" y="0"/>
+            <a:ext cx="4941771" cy="619760"/>
+          </a:xfrm>
+          <a:prstGeom prst="rect">
+            <a:avLst/>
+          </a:prstGeom>
+        </p:spPr>
+        <p:txBody>
+          <a:bodyPr vert="horz" lIns="91440" tIns="45720" rIns="91440" bIns="45720" rtlCol="0" anchor="b">
+            <a:normAutofit/>
+          </a:bodyPr>
+          <a:lstStyle>
+            <a:lvl1pPr algn="l" defTabSz="914400" rtl="0" eaLnBrk="1" latinLnBrk="0" hangingPunct="1">
+              <a:lnSpc>
+                <a:spcPct val="90000"/>
+              </a:lnSpc>
+              <a:spcBef>
+                <a:spcPct val="0"/>
+              </a:spcBef>
+              <a:buNone/>
+              <a:defRPr lang="en-US" sz="2800" kern="1200" cap="all" spc="150" baseline="0" dirty="0">
+                <a:solidFill>
+                  <a:schemeClr val="tx1"/>
+                </a:solidFill>
+                <a:latin typeface="+mj-lt"/>
+                <a:ea typeface="+mj-ea"/>
+                <a:cs typeface="+mj-cs"/>
+              </a:defRPr>
+            </a:lvl1pPr>
+          </a:lstStyle>
+          <a:p>
+            <a:pPr algn="r"/>
+            <a:r>
+              <a:rPr lang="en-GB" dirty="0"/>
+              <a:t>Opulence money | pitch</a:t>
+            </a:r>
+          </a:p>
+        </p:txBody>
+      </p:sp>
+      <p:sp>
+        <p:nvSpPr>
+          <p:cNvPr id="12" name="TextBox 11">
+            <a:extLst>
+              <a:ext uri="{FF2B5EF4-FFF2-40B4-BE49-F238E27FC236}">
+                <a16:creationId xmlns:a16="http://schemas.microsoft.com/office/drawing/2014/main" id="{A6352F46-C3C3-0842-C669-2889E7C54D2D}"/>
+              </a:ext>
+            </a:extLst>
+          </p:cNvPr>
+          <p:cNvSpPr txBox="1"/>
+          <p:nvPr/>
+        </p:nvSpPr>
+        <p:spPr>
+          <a:xfrm>
+            <a:off x="6395720" y="894080"/>
+            <a:ext cx="4038600" cy="1477328"/>
+          </a:xfrm>
+          <a:prstGeom prst="rect">
+            <a:avLst/>
+          </a:prstGeom>
+          <a:noFill/>
+        </p:spPr>
+        <p:txBody>
+          <a:bodyPr wrap="square" rtlCol="0">
+            <a:spAutoFit/>
+          </a:bodyPr>
+          <a:lstStyle/>
+          <a:p>
+            <a:r>
+              <a:rPr lang="en-GB" b="1" dirty="0">
+                <a:solidFill>
+                  <a:schemeClr val="tx1"/>
+                </a:solidFill>
+              </a:rPr>
+              <a:t>Who we are</a:t>
+            </a:r>
+          </a:p>
+          <a:p>
+            <a:pPr marL="285750" indent="-285750">
+              <a:buFont typeface="Arial" panose="020B0604020202020204" pitchFamily="34" charset="0"/>
+              <a:buChar char="•"/>
+            </a:pPr>
+            <a:r>
+              <a:rPr lang="en-GB" dirty="0">
+                <a:solidFill>
+                  <a:schemeClr val="tx1"/>
+                </a:solidFill>
+              </a:rPr>
+              <a:t>Computer Science UGs @ Durham</a:t>
+            </a:r>
+          </a:p>
+          <a:p>
+            <a:pPr marL="285750" indent="-285750">
+              <a:buFont typeface="Arial" panose="020B0604020202020204" pitchFamily="34" charset="0"/>
+              <a:buChar char="•"/>
+            </a:pPr>
+            <a:r>
+              <a:rPr lang="en-GB" dirty="0">
+                <a:solidFill>
+                  <a:schemeClr val="tx1"/>
+                </a:solidFill>
+              </a:rPr>
+              <a:t>Apply skills to real-life</a:t>
+            </a:r>
+          </a:p>
+          <a:p>
+            <a:pPr marL="285750" indent="-285750">
+              <a:buFont typeface="Arial" panose="020B0604020202020204" pitchFamily="34" charset="0"/>
+              <a:buChar char="•"/>
+            </a:pPr>
+            <a:r>
+              <a:rPr lang="en-GB" dirty="0">
+                <a:solidFill>
+                  <a:schemeClr val="tx1"/>
+                </a:solidFill>
+              </a:rPr>
+              <a:t>Interest in finance</a:t>
+            </a:r>
+          </a:p>
+          <a:p>
+            <a:pPr marL="285750" indent="-285750">
+              <a:buFont typeface="Arial" panose="020B0604020202020204" pitchFamily="34" charset="0"/>
+              <a:buChar char="•"/>
+            </a:pPr>
+            <a:r>
+              <a:rPr lang="en-GB" dirty="0">
+                <a:solidFill>
+                  <a:schemeClr val="tx1"/>
+                </a:solidFill>
+              </a:rPr>
+              <a:t>Want to benefit individuals</a:t>
+            </a:r>
+          </a:p>
+        </p:txBody>
+      </p:sp>
+    </p:spTree>
+    <p:extLst>
+      <p:ext uri="{BB962C8B-B14F-4D97-AF65-F5344CB8AC3E}">
+        <p14:creationId xmlns:p14="http://schemas.microsoft.com/office/powerpoint/2010/main" val="927286296"/>
       </p:ext>
     </p:extLst>
   </p:cSld>

</xml_diff>